<commit_message>
Code optimized for high poly obj
</commit_message>
<xml_diff>
--- a/Presentations/Computation of Hausdorff Distance between 3D Meshes.pptx
+++ b/Presentations/Computation of Hausdorff Distance between 3D Meshes.pptx
@@ -207,7 +207,7 @@
           <a:p>
             <a:fld id="{08796811-8B54-41C7-8511-EAB45DB63E88}" type="datetimeFigureOut">
               <a:rPr lang="tr-TR" smtClean="0"/>
-              <a:t>20.12.2021</a:t>
+              <a:t>8.04.2022</a:t>
             </a:fld>
             <a:endParaRPr lang="tr-TR"/>
           </a:p>
@@ -531,7 +531,7 @@
           <a:noFill/>
           <a:extLst>
             <a:ext uri="{909E8E84-426E-40dd-AFC4-6F175D3DCCD1}">
-              <a14:hiddenFill xmlns="" xmlns:a14="http://schemas.microsoft.com/office/drawing/2010/main">
+              <a14:hiddenFill xmlns:a14="http://schemas.microsoft.com/office/drawing/2010/main" xmlns="">
                 <a:solidFill>
                   <a:srgbClr val="FFFFFF"/>
                 </a:solidFill>
@@ -590,7 +590,7 @@
             </a:ln>
             <a:extLst>
               <a:ext uri="{91240B29-F687-4f45-9708-019B960494DF}">
-                <a14:hiddenLine xmlns="" xmlns:a14="http://schemas.microsoft.com/office/drawing/2010/main" w="9525">
+                <a14:hiddenLine xmlns:a14="http://schemas.microsoft.com/office/drawing/2010/main" xmlns="" w="9525">
                   <a:solidFill>
                     <a:srgbClr val="000000"/>
                   </a:solidFill>
@@ -680,7 +680,7 @@
             </a:ln>
             <a:extLst>
               <a:ext uri="{91240B29-F687-4f45-9708-019B960494DF}">
-                <a14:hiddenLine xmlns="" xmlns:a14="http://schemas.microsoft.com/office/drawing/2010/main" w="9525">
+                <a14:hiddenLine xmlns:a14="http://schemas.microsoft.com/office/drawing/2010/main" xmlns="" w="9525">
                   <a:solidFill>
                     <a:srgbClr val="000000"/>
                   </a:solidFill>
@@ -770,7 +770,7 @@
             </a:ln>
             <a:extLst>
               <a:ext uri="{91240B29-F687-4f45-9708-019B960494DF}">
-                <a14:hiddenLine xmlns="" xmlns:a14="http://schemas.microsoft.com/office/drawing/2010/main" w="9525">
+                <a14:hiddenLine xmlns:a14="http://schemas.microsoft.com/office/drawing/2010/main" xmlns="" w="9525">
                   <a:solidFill>
                     <a:srgbClr val="000000"/>
                   </a:solidFill>
@@ -804,7 +804,7 @@
             </a:ln>
             <a:extLst>
               <a:ext uri="{91240B29-F687-4f45-9708-019B960494DF}">
-                <a14:hiddenLine xmlns="" xmlns:a14="http://schemas.microsoft.com/office/drawing/2010/main" w="9525">
+                <a14:hiddenLine xmlns:a14="http://schemas.microsoft.com/office/drawing/2010/main" xmlns="" w="9525">
                   <a:solidFill>
                     <a:srgbClr val="000000"/>
                   </a:solidFill>
@@ -894,7 +894,7 @@
             </a:ln>
             <a:extLst>
               <a:ext uri="{91240B29-F687-4f45-9708-019B960494DF}">
-                <a14:hiddenLine xmlns="" xmlns:a14="http://schemas.microsoft.com/office/drawing/2010/main" w="9525">
+                <a14:hiddenLine xmlns:a14="http://schemas.microsoft.com/office/drawing/2010/main" xmlns="" w="9525">
                   <a:solidFill>
                     <a:srgbClr val="000000"/>
                   </a:solidFill>
@@ -956,7 +956,7 @@
             </a:ln>
             <a:extLst>
               <a:ext uri="{91240B29-F687-4f45-9708-019B960494DF}">
-                <a14:hiddenLine xmlns="" xmlns:a14="http://schemas.microsoft.com/office/drawing/2010/main" w="9525">
+                <a14:hiddenLine xmlns:a14="http://schemas.microsoft.com/office/drawing/2010/main" xmlns="" w="9525">
                   <a:solidFill>
                     <a:srgbClr val="000000"/>
                   </a:solidFill>
@@ -1018,7 +1018,7 @@
             </a:ln>
             <a:extLst>
               <a:ext uri="{91240B29-F687-4f45-9708-019B960494DF}">
-                <a14:hiddenLine xmlns="" xmlns:a14="http://schemas.microsoft.com/office/drawing/2010/main" w="9525">
+                <a14:hiddenLine xmlns:a14="http://schemas.microsoft.com/office/drawing/2010/main" xmlns="" w="9525">
                   <a:solidFill>
                     <a:srgbClr val="000000"/>
                   </a:solidFill>
@@ -1108,7 +1108,7 @@
             </a:ln>
             <a:extLst>
               <a:ext uri="{91240B29-F687-4f45-9708-019B960494DF}">
-                <a14:hiddenLine xmlns="" xmlns:a14="http://schemas.microsoft.com/office/drawing/2010/main" w="9525">
+                <a14:hiddenLine xmlns:a14="http://schemas.microsoft.com/office/drawing/2010/main" xmlns="" w="9525">
                   <a:solidFill>
                     <a:srgbClr val="000000"/>
                   </a:solidFill>
@@ -1170,7 +1170,7 @@
             </a:ln>
             <a:extLst>
               <a:ext uri="{91240B29-F687-4f45-9708-019B960494DF}">
-                <a14:hiddenLine xmlns="" xmlns:a14="http://schemas.microsoft.com/office/drawing/2010/main" w="9525">
+                <a14:hiddenLine xmlns:a14="http://schemas.microsoft.com/office/drawing/2010/main" xmlns="" w="9525">
                   <a:solidFill>
                     <a:srgbClr val="000000"/>
                   </a:solidFill>
@@ -1232,7 +1232,7 @@
             </a:ln>
             <a:extLst>
               <a:ext uri="{91240B29-F687-4f45-9708-019B960494DF}">
-                <a14:hiddenLine xmlns="" xmlns:a14="http://schemas.microsoft.com/office/drawing/2010/main" w="9525">
+                <a14:hiddenLine xmlns:a14="http://schemas.microsoft.com/office/drawing/2010/main" xmlns="" w="9525">
                   <a:solidFill>
                     <a:srgbClr val="000000"/>
                   </a:solidFill>
@@ -1322,7 +1322,7 @@
             </a:ln>
             <a:extLst>
               <a:ext uri="{91240B29-F687-4f45-9708-019B960494DF}">
-                <a14:hiddenLine xmlns="" xmlns:a14="http://schemas.microsoft.com/office/drawing/2010/main" w="9525">
+                <a14:hiddenLine xmlns:a14="http://schemas.microsoft.com/office/drawing/2010/main" xmlns="" w="9525">
                   <a:solidFill>
                     <a:srgbClr val="000000"/>
                   </a:solidFill>
@@ -1412,7 +1412,7 @@
             </a:ln>
             <a:extLst>
               <a:ext uri="{91240B29-F687-4f45-9708-019B960494DF}">
-                <a14:hiddenLine xmlns="" xmlns:a14="http://schemas.microsoft.com/office/drawing/2010/main" w="9525">
+                <a14:hiddenLine xmlns:a14="http://schemas.microsoft.com/office/drawing/2010/main" xmlns="" w="9525">
                   <a:solidFill>
                     <a:srgbClr val="000000"/>
                   </a:solidFill>
@@ -1474,7 +1474,7 @@
             </a:ln>
             <a:extLst>
               <a:ext uri="{91240B29-F687-4f45-9708-019B960494DF}">
-                <a14:hiddenLine xmlns="" xmlns:a14="http://schemas.microsoft.com/office/drawing/2010/main" w="9525">
+                <a14:hiddenLine xmlns:a14="http://schemas.microsoft.com/office/drawing/2010/main" xmlns="" w="9525">
                   <a:solidFill>
                     <a:srgbClr val="000000"/>
                   </a:solidFill>
@@ -1584,7 +1584,7 @@
             </a:ln>
             <a:extLst>
               <a:ext uri="{91240B29-F687-4f45-9708-019B960494DF}">
-                <a14:hiddenLine xmlns="" xmlns:a14="http://schemas.microsoft.com/office/drawing/2010/main" w="9525">
+                <a14:hiddenLine xmlns:a14="http://schemas.microsoft.com/office/drawing/2010/main" xmlns="" w="9525">
                   <a:solidFill>
                     <a:srgbClr val="000000"/>
                   </a:solidFill>
@@ -1646,7 +1646,7 @@
             </a:ln>
             <a:extLst>
               <a:ext uri="{91240B29-F687-4f45-9708-019B960494DF}">
-                <a14:hiddenLine xmlns="" xmlns:a14="http://schemas.microsoft.com/office/drawing/2010/main" w="9525">
+                <a14:hiddenLine xmlns:a14="http://schemas.microsoft.com/office/drawing/2010/main" xmlns="" w="9525">
                   <a:solidFill>
                     <a:srgbClr val="000000"/>
                   </a:solidFill>
@@ -1736,7 +1736,7 @@
             </a:ln>
             <a:extLst>
               <a:ext uri="{91240B29-F687-4f45-9708-019B960494DF}">
-                <a14:hiddenLine xmlns="" xmlns:a14="http://schemas.microsoft.com/office/drawing/2010/main" w="9525">
+                <a14:hiddenLine xmlns:a14="http://schemas.microsoft.com/office/drawing/2010/main" xmlns="" w="9525">
                   <a:solidFill>
                     <a:srgbClr val="000000"/>
                   </a:solidFill>
@@ -1826,7 +1826,7 @@
             </a:ln>
             <a:extLst>
               <a:ext uri="{91240B29-F687-4f45-9708-019B960494DF}">
-                <a14:hiddenLine xmlns="" xmlns:a14="http://schemas.microsoft.com/office/drawing/2010/main" w="9525">
+                <a14:hiddenLine xmlns:a14="http://schemas.microsoft.com/office/drawing/2010/main" xmlns="" w="9525">
                   <a:solidFill>
                     <a:srgbClr val="000000"/>
                   </a:solidFill>
@@ -1888,7 +1888,7 @@
             </a:ln>
             <a:extLst>
               <a:ext uri="{91240B29-F687-4f45-9708-019B960494DF}">
-                <a14:hiddenLine xmlns="" xmlns:a14="http://schemas.microsoft.com/office/drawing/2010/main" w="9525">
+                <a14:hiddenLine xmlns:a14="http://schemas.microsoft.com/office/drawing/2010/main" xmlns="" w="9525">
                   <a:solidFill>
                     <a:srgbClr val="000000"/>
                   </a:solidFill>
@@ -1978,7 +1978,7 @@
             </a:ln>
             <a:extLst>
               <a:ext uri="{91240B29-F687-4f45-9708-019B960494DF}">
-                <a14:hiddenLine xmlns="" xmlns:a14="http://schemas.microsoft.com/office/drawing/2010/main" w="9525">
+                <a14:hiddenLine xmlns:a14="http://schemas.microsoft.com/office/drawing/2010/main" xmlns="" w="9525">
                   <a:solidFill>
                     <a:srgbClr val="000000"/>
                   </a:solidFill>
@@ -2068,7 +2068,7 @@
             </a:ln>
             <a:extLst>
               <a:ext uri="{91240B29-F687-4f45-9708-019B960494DF}">
-                <a14:hiddenLine xmlns="" xmlns:a14="http://schemas.microsoft.com/office/drawing/2010/main" w="9525">
+                <a14:hiddenLine xmlns:a14="http://schemas.microsoft.com/office/drawing/2010/main" xmlns="" w="9525">
                   <a:solidFill>
                     <a:srgbClr val="000000"/>
                   </a:solidFill>
@@ -2124,7 +2124,7 @@
             </a:ln>
             <a:extLst>
               <a:ext uri="{91240B29-F687-4f45-9708-019B960494DF}">
-                <a14:hiddenLine xmlns="" xmlns:a14="http://schemas.microsoft.com/office/drawing/2010/main" w="9525">
+                <a14:hiddenLine xmlns:a14="http://schemas.microsoft.com/office/drawing/2010/main" xmlns="" w="9525">
                   <a:solidFill>
                     <a:srgbClr val="000000"/>
                   </a:solidFill>
@@ -2214,7 +2214,7 @@
             </a:ln>
             <a:extLst>
               <a:ext uri="{91240B29-F687-4f45-9708-019B960494DF}">
-                <a14:hiddenLine xmlns="" xmlns:a14="http://schemas.microsoft.com/office/drawing/2010/main" w="9525">
+                <a14:hiddenLine xmlns:a14="http://schemas.microsoft.com/office/drawing/2010/main" xmlns="" w="9525">
                   <a:solidFill>
                     <a:srgbClr val="000000"/>
                   </a:solidFill>
@@ -2270,7 +2270,7 @@
             </a:ln>
             <a:extLst>
               <a:ext uri="{91240B29-F687-4f45-9708-019B960494DF}">
-                <a14:hiddenLine xmlns="" xmlns:a14="http://schemas.microsoft.com/office/drawing/2010/main" w="9525">
+                <a14:hiddenLine xmlns:a14="http://schemas.microsoft.com/office/drawing/2010/main" xmlns="" w="9525">
                   <a:solidFill>
                     <a:srgbClr val="000000"/>
                   </a:solidFill>
@@ -2360,7 +2360,7 @@
             </a:ln>
             <a:extLst>
               <a:ext uri="{91240B29-F687-4f45-9708-019B960494DF}">
-                <a14:hiddenLine xmlns="" xmlns:a14="http://schemas.microsoft.com/office/drawing/2010/main" w="9525">
+                <a14:hiddenLine xmlns:a14="http://schemas.microsoft.com/office/drawing/2010/main" xmlns="" w="9525">
                   <a:solidFill>
                     <a:srgbClr val="000000"/>
                   </a:solidFill>
@@ -2428,7 +2428,7 @@
             </a:ln>
             <a:extLst>
               <a:ext uri="{91240B29-F687-4f45-9708-019B960494DF}">
-                <a14:hiddenLine xmlns="" xmlns:a14="http://schemas.microsoft.com/office/drawing/2010/main" w="9525">
+                <a14:hiddenLine xmlns:a14="http://schemas.microsoft.com/office/drawing/2010/main" xmlns="" w="9525">
                   <a:solidFill>
                     <a:srgbClr val="000000"/>
                   </a:solidFill>
@@ -2518,7 +2518,7 @@
             </a:ln>
             <a:extLst>
               <a:ext uri="{91240B29-F687-4f45-9708-019B960494DF}">
-                <a14:hiddenLine xmlns="" xmlns:a14="http://schemas.microsoft.com/office/drawing/2010/main" w="9525">
+                <a14:hiddenLine xmlns:a14="http://schemas.microsoft.com/office/drawing/2010/main" xmlns="" w="9525">
                   <a:solidFill>
                     <a:srgbClr val="000000"/>
                   </a:solidFill>
@@ -2586,7 +2586,7 @@
             </a:ln>
             <a:extLst>
               <a:ext uri="{91240B29-F687-4f45-9708-019B960494DF}">
-                <a14:hiddenLine xmlns="" xmlns:a14="http://schemas.microsoft.com/office/drawing/2010/main" w="9525">
+                <a14:hiddenLine xmlns:a14="http://schemas.microsoft.com/office/drawing/2010/main" xmlns="" w="9525">
                   <a:solidFill>
                     <a:srgbClr val="000000"/>
                   </a:solidFill>
@@ -2676,7 +2676,7 @@
             </a:ln>
             <a:extLst>
               <a:ext uri="{91240B29-F687-4f45-9708-019B960494DF}">
-                <a14:hiddenLine xmlns="" xmlns:a14="http://schemas.microsoft.com/office/drawing/2010/main" w="9525">
+                <a14:hiddenLine xmlns:a14="http://schemas.microsoft.com/office/drawing/2010/main" xmlns="" w="9525">
                   <a:solidFill>
                     <a:srgbClr val="000000"/>
                   </a:solidFill>
@@ -2710,7 +2710,7 @@
             </a:ln>
             <a:extLst>
               <a:ext uri="{91240B29-F687-4f45-9708-019B960494DF}">
-                <a14:hiddenLine xmlns="" xmlns:a14="http://schemas.microsoft.com/office/drawing/2010/main" w="9525">
+                <a14:hiddenLine xmlns:a14="http://schemas.microsoft.com/office/drawing/2010/main" xmlns="" w="9525">
                   <a:solidFill>
                     <a:srgbClr val="000000"/>
                   </a:solidFill>
@@ -2800,7 +2800,7 @@
             </a:ln>
             <a:extLst>
               <a:ext uri="{91240B29-F687-4f45-9708-019B960494DF}">
-                <a14:hiddenLine xmlns="" xmlns:a14="http://schemas.microsoft.com/office/drawing/2010/main" w="9525">
+                <a14:hiddenLine xmlns:a14="http://schemas.microsoft.com/office/drawing/2010/main" xmlns="" w="9525">
                   <a:solidFill>
                     <a:srgbClr val="000000"/>
                   </a:solidFill>
@@ -2862,7 +2862,7 @@
             </a:ln>
             <a:extLst>
               <a:ext uri="{91240B29-F687-4f45-9708-019B960494DF}">
-                <a14:hiddenLine xmlns="" xmlns:a14="http://schemas.microsoft.com/office/drawing/2010/main" w="9525">
+                <a14:hiddenLine xmlns:a14="http://schemas.microsoft.com/office/drawing/2010/main" xmlns="" w="9525">
                   <a:solidFill>
                     <a:srgbClr val="000000"/>
                   </a:solidFill>
@@ -2924,7 +2924,7 @@
             </a:ln>
             <a:extLst>
               <a:ext uri="{91240B29-F687-4f45-9708-019B960494DF}">
-                <a14:hiddenLine xmlns="" xmlns:a14="http://schemas.microsoft.com/office/drawing/2010/main" w="9525">
+                <a14:hiddenLine xmlns:a14="http://schemas.microsoft.com/office/drawing/2010/main" xmlns="" w="9525">
                   <a:solidFill>
                     <a:srgbClr val="000000"/>
                   </a:solidFill>
@@ -3014,7 +3014,7 @@
             </a:ln>
             <a:extLst>
               <a:ext uri="{91240B29-F687-4f45-9708-019B960494DF}">
-                <a14:hiddenLine xmlns="" xmlns:a14="http://schemas.microsoft.com/office/drawing/2010/main" w="9525">
+                <a14:hiddenLine xmlns:a14="http://schemas.microsoft.com/office/drawing/2010/main" xmlns="" w="9525">
                   <a:solidFill>
                     <a:srgbClr val="000000"/>
                   </a:solidFill>
@@ -3082,7 +3082,7 @@
             </a:ln>
             <a:extLst>
               <a:ext uri="{91240B29-F687-4f45-9708-019B960494DF}">
-                <a14:hiddenLine xmlns="" xmlns:a14="http://schemas.microsoft.com/office/drawing/2010/main" w="9525">
+                <a14:hiddenLine xmlns:a14="http://schemas.microsoft.com/office/drawing/2010/main" xmlns="" w="9525">
                   <a:solidFill>
                     <a:srgbClr val="000000"/>
                   </a:solidFill>
@@ -3144,7 +3144,7 @@
             </a:ln>
             <a:extLst>
               <a:ext uri="{91240B29-F687-4f45-9708-019B960494DF}">
-                <a14:hiddenLine xmlns="" xmlns:a14="http://schemas.microsoft.com/office/drawing/2010/main" w="9525">
+                <a14:hiddenLine xmlns:a14="http://schemas.microsoft.com/office/drawing/2010/main" xmlns="" w="9525">
                   <a:solidFill>
                     <a:srgbClr val="000000"/>
                   </a:solidFill>
@@ -3234,7 +3234,7 @@
             </a:ln>
             <a:extLst>
               <a:ext uri="{91240B29-F687-4f45-9708-019B960494DF}">
-                <a14:hiddenLine xmlns="" xmlns:a14="http://schemas.microsoft.com/office/drawing/2010/main" w="9525">
+                <a14:hiddenLine xmlns:a14="http://schemas.microsoft.com/office/drawing/2010/main" xmlns="" w="9525">
                   <a:solidFill>
                     <a:srgbClr val="000000"/>
                   </a:solidFill>
@@ -3296,7 +3296,7 @@
             </a:ln>
             <a:extLst>
               <a:ext uri="{91240B29-F687-4f45-9708-019B960494DF}">
-                <a14:hiddenLine xmlns="" xmlns:a14="http://schemas.microsoft.com/office/drawing/2010/main" w="9525">
+                <a14:hiddenLine xmlns:a14="http://schemas.microsoft.com/office/drawing/2010/main" xmlns="" w="9525">
                   <a:solidFill>
                     <a:srgbClr val="000000"/>
                   </a:solidFill>
@@ -3386,7 +3386,7 @@
             </a:ln>
             <a:extLst>
               <a:ext uri="{91240B29-F687-4f45-9708-019B960494DF}">
-                <a14:hiddenLine xmlns="" xmlns:a14="http://schemas.microsoft.com/office/drawing/2010/main" w="9525">
+                <a14:hiddenLine xmlns:a14="http://schemas.microsoft.com/office/drawing/2010/main" xmlns="" w="9525">
                   <a:solidFill>
                     <a:srgbClr val="000000"/>
                   </a:solidFill>
@@ -3448,7 +3448,7 @@
             </a:ln>
             <a:extLst>
               <a:ext uri="{91240B29-F687-4f45-9708-019B960494DF}">
-                <a14:hiddenLine xmlns="" xmlns:a14="http://schemas.microsoft.com/office/drawing/2010/main" w="9525">
+                <a14:hiddenLine xmlns:a14="http://schemas.microsoft.com/office/drawing/2010/main" xmlns="" w="9525">
                   <a:solidFill>
                     <a:srgbClr val="000000"/>
                   </a:solidFill>
@@ -3538,7 +3538,7 @@
             </a:ln>
             <a:extLst>
               <a:ext uri="{91240B29-F687-4f45-9708-019B960494DF}">
-                <a14:hiddenLine xmlns="" xmlns:a14="http://schemas.microsoft.com/office/drawing/2010/main" w="9525">
+                <a14:hiddenLine xmlns:a14="http://schemas.microsoft.com/office/drawing/2010/main" xmlns="" w="9525">
                   <a:solidFill>
                     <a:srgbClr val="000000"/>
                   </a:solidFill>
@@ -3572,7 +3572,7 @@
             </a:ln>
             <a:extLst>
               <a:ext uri="{91240B29-F687-4f45-9708-019B960494DF}">
-                <a14:hiddenLine xmlns="" xmlns:a14="http://schemas.microsoft.com/office/drawing/2010/main" w="9525">
+                <a14:hiddenLine xmlns:a14="http://schemas.microsoft.com/office/drawing/2010/main" xmlns="" w="9525">
                   <a:solidFill>
                     <a:srgbClr val="000000"/>
                   </a:solidFill>
@@ -3637,7 +3637,7 @@
             </a:ln>
             <a:extLst>
               <a:ext uri="{91240B29-F687-4f45-9708-019B960494DF}">
-                <a14:hiddenLine xmlns="" xmlns:a14="http://schemas.microsoft.com/office/drawing/2010/main" w="9525">
+                <a14:hiddenLine xmlns:a14="http://schemas.microsoft.com/office/drawing/2010/main" xmlns="" w="9525">
                   <a:solidFill>
                     <a:srgbClr val="000000"/>
                   </a:solidFill>
@@ -3727,7 +3727,7 @@
             </a:ln>
             <a:extLst>
               <a:ext uri="{91240B29-F687-4f45-9708-019B960494DF}">
-                <a14:hiddenLine xmlns="" xmlns:a14="http://schemas.microsoft.com/office/drawing/2010/main" w="9525">
+                <a14:hiddenLine xmlns:a14="http://schemas.microsoft.com/office/drawing/2010/main" xmlns="" w="9525">
                   <a:solidFill>
                     <a:srgbClr val="000000"/>
                   </a:solidFill>
@@ -3789,7 +3789,7 @@
             </a:ln>
             <a:extLst>
               <a:ext uri="{91240B29-F687-4f45-9708-019B960494DF}">
-                <a14:hiddenLine xmlns="" xmlns:a14="http://schemas.microsoft.com/office/drawing/2010/main" w="9525">
+                <a14:hiddenLine xmlns:a14="http://schemas.microsoft.com/office/drawing/2010/main" xmlns="" w="9525">
                   <a:solidFill>
                     <a:srgbClr val="000000"/>
                   </a:solidFill>
@@ -3879,7 +3879,7 @@
             </a:ln>
             <a:extLst>
               <a:ext uri="{91240B29-F687-4f45-9708-019B960494DF}">
-                <a14:hiddenLine xmlns="" xmlns:a14="http://schemas.microsoft.com/office/drawing/2010/main" w="9525">
+                <a14:hiddenLine xmlns:a14="http://schemas.microsoft.com/office/drawing/2010/main" xmlns="" w="9525">
                   <a:solidFill>
                     <a:srgbClr val="000000"/>
                   </a:solidFill>
@@ -3969,7 +3969,7 @@
             </a:ln>
             <a:extLst>
               <a:ext uri="{91240B29-F687-4f45-9708-019B960494DF}">
-                <a14:hiddenLine xmlns="" xmlns:a14="http://schemas.microsoft.com/office/drawing/2010/main" w="9525">
+                <a14:hiddenLine xmlns:a14="http://schemas.microsoft.com/office/drawing/2010/main" xmlns="" w="9525">
                   <a:solidFill>
                     <a:srgbClr val="000000"/>
                   </a:solidFill>
@@ -4034,7 +4034,7 @@
             </a:ln>
             <a:extLst>
               <a:ext uri="{91240B29-F687-4f45-9708-019B960494DF}">
-                <a14:hiddenLine xmlns="" xmlns:a14="http://schemas.microsoft.com/office/drawing/2010/main" w="9525">
+                <a14:hiddenLine xmlns:a14="http://schemas.microsoft.com/office/drawing/2010/main" xmlns="" w="9525">
                   <a:solidFill>
                     <a:srgbClr val="000000"/>
                   </a:solidFill>
@@ -4096,7 +4096,7 @@
             </a:ln>
             <a:extLst>
               <a:ext uri="{91240B29-F687-4f45-9708-019B960494DF}">
-                <a14:hiddenLine xmlns="" xmlns:a14="http://schemas.microsoft.com/office/drawing/2010/main" w="9525">
+                <a14:hiddenLine xmlns:a14="http://schemas.microsoft.com/office/drawing/2010/main" xmlns="" w="9525">
                   <a:solidFill>
                     <a:srgbClr val="000000"/>
                   </a:solidFill>
@@ -4186,7 +4186,7 @@
             </a:ln>
             <a:extLst>
               <a:ext uri="{91240B29-F687-4f45-9708-019B960494DF}">
-                <a14:hiddenLine xmlns="" xmlns:a14="http://schemas.microsoft.com/office/drawing/2010/main" w="9525">
+                <a14:hiddenLine xmlns:a14="http://schemas.microsoft.com/office/drawing/2010/main" xmlns="" w="9525">
                   <a:solidFill>
                     <a:srgbClr val="000000"/>
                   </a:solidFill>
@@ -4276,7 +4276,7 @@
             </a:ln>
             <a:extLst>
               <a:ext uri="{91240B29-F687-4f45-9708-019B960494DF}">
-                <a14:hiddenLine xmlns="" xmlns:a14="http://schemas.microsoft.com/office/drawing/2010/main" w="9525">
+                <a14:hiddenLine xmlns:a14="http://schemas.microsoft.com/office/drawing/2010/main" xmlns="" w="9525">
                   <a:solidFill>
                     <a:srgbClr val="000000"/>
                   </a:solidFill>
@@ -4338,7 +4338,7 @@
             </a:ln>
             <a:extLst>
               <a:ext uri="{91240B29-F687-4f45-9708-019B960494DF}">
-                <a14:hiddenLine xmlns="" xmlns:a14="http://schemas.microsoft.com/office/drawing/2010/main" w="9525">
+                <a14:hiddenLine xmlns:a14="http://schemas.microsoft.com/office/drawing/2010/main" xmlns="" w="9525">
                   <a:solidFill>
                     <a:srgbClr val="000000"/>
                   </a:solidFill>
@@ -4458,7 +4458,7 @@
             </a:ln>
             <a:extLst>
               <a:ext uri="{91240B29-F687-4f45-9708-019B960494DF}">
-                <a14:hiddenLine xmlns="" xmlns:a14="http://schemas.microsoft.com/office/drawing/2010/main" w="9525">
+                <a14:hiddenLine xmlns:a14="http://schemas.microsoft.com/office/drawing/2010/main" xmlns="" w="9525">
                   <a:solidFill>
                     <a:srgbClr val="000000"/>
                   </a:solidFill>
@@ -4526,7 +4526,7 @@
             </a:ln>
             <a:extLst>
               <a:ext uri="{91240B29-F687-4f45-9708-019B960494DF}">
-                <a14:hiddenLine xmlns="" xmlns:a14="http://schemas.microsoft.com/office/drawing/2010/main" w="9525">
+                <a14:hiddenLine xmlns:a14="http://schemas.microsoft.com/office/drawing/2010/main" xmlns="" w="9525">
                   <a:solidFill>
                     <a:srgbClr val="000000"/>
                   </a:solidFill>
@@ -4616,7 +4616,7 @@
             </a:ln>
             <a:extLst>
               <a:ext uri="{91240B29-F687-4f45-9708-019B960494DF}">
-                <a14:hiddenLine xmlns="" xmlns:a14="http://schemas.microsoft.com/office/drawing/2010/main" w="9525">
+                <a14:hiddenLine xmlns:a14="http://schemas.microsoft.com/office/drawing/2010/main" xmlns="" w="9525">
                   <a:solidFill>
                     <a:srgbClr val="000000"/>
                   </a:solidFill>
@@ -4756,7 +4756,7 @@
           <a:p>
             <a:fld id="{4AC52E11-AD7D-4F41-8B9A-F635C7ADBAA0}" type="datetime1">
               <a:rPr lang="en-US" smtClean="0"/>
-              <a:t>12/20/2021</a:t>
+              <a:t>4/8/2022</a:t>
             </a:fld>
             <a:endParaRPr lang="en-US" dirty="0"/>
           </a:p>
@@ -4823,13 +4823,13 @@
   <p:clrMapOvr>
     <a:masterClrMapping/>
   </p:clrMapOvr>
-  <mc:AlternateContent xmlns:mc="http://schemas.openxmlformats.org/markup-compatibility/2006">
-    <mc:Choice xmlns:p159="http://schemas.microsoft.com/office/powerpoint/2015/09/main" Requires="p159">
+  <mc:AlternateContent xmlns:mc="http://schemas.openxmlformats.org/markup-compatibility/2006" xmlns:p159="http://schemas.microsoft.com/office/powerpoint/2015/09/main">
+    <mc:Choice Requires="p159">
       <p:transition xmlns:p14="http://schemas.microsoft.com/office/powerpoint/2010/main" spd="slow" p14:dur="2000">
         <p159:morph option="byObject"/>
       </p:transition>
     </mc:Choice>
-    <mc:Fallback>
+    <mc:Fallback xmlns="">
       <p:transition spd="slow">
         <p:fade/>
       </p:transition>
@@ -5034,7 +5034,7 @@
           <a:p>
             <a:fld id="{2AB72802-7492-4BC2-AC02-AE7CED8C5F24}" type="datetime1">
               <a:rPr lang="en-US" smtClean="0"/>
-              <a:t>12/20/2021</a:t>
+              <a:t>4/8/2022</a:t>
             </a:fld>
             <a:endParaRPr lang="en-US" dirty="0"/>
           </a:p>
@@ -5091,13 +5091,13 @@
   <p:clrMapOvr>
     <a:masterClrMapping/>
   </p:clrMapOvr>
-  <mc:AlternateContent xmlns:mc="http://schemas.openxmlformats.org/markup-compatibility/2006">
-    <mc:Choice xmlns:p159="http://schemas.microsoft.com/office/powerpoint/2015/09/main" Requires="p159">
+  <mc:AlternateContent xmlns:mc="http://schemas.openxmlformats.org/markup-compatibility/2006" xmlns:p159="http://schemas.microsoft.com/office/powerpoint/2015/09/main">
+    <mc:Choice Requires="p159">
       <p:transition xmlns:p14="http://schemas.microsoft.com/office/powerpoint/2010/main" spd="slow" p14:dur="2000">
         <p159:morph option="byObject"/>
       </p:transition>
     </mc:Choice>
-    <mc:Fallback>
+    <mc:Fallback xmlns="">
       <p:transition spd="slow">
         <p:fade/>
       </p:transition>
@@ -5241,7 +5241,7 @@
           <a:p>
             <a:fld id="{62503AC0-DF0A-4F61-BAD3-B645427CA9A3}" type="datetime1">
               <a:rPr lang="en-US" smtClean="0"/>
-              <a:t>12/20/2021</a:t>
+              <a:t>4/8/2022</a:t>
             </a:fld>
             <a:endParaRPr lang="en-US" dirty="0"/>
           </a:p>
@@ -5298,13 +5298,13 @@
   <p:clrMapOvr>
     <a:masterClrMapping/>
   </p:clrMapOvr>
-  <mc:AlternateContent xmlns:mc="http://schemas.openxmlformats.org/markup-compatibility/2006">
-    <mc:Choice xmlns:p159="http://schemas.microsoft.com/office/powerpoint/2015/09/main" Requires="p159">
+  <mc:AlternateContent xmlns:mc="http://schemas.openxmlformats.org/markup-compatibility/2006" xmlns:p159="http://schemas.microsoft.com/office/powerpoint/2015/09/main">
+    <mc:Choice Requires="p159">
       <p:transition xmlns:p14="http://schemas.microsoft.com/office/powerpoint/2010/main" spd="slow" p14:dur="2000">
         <p159:morph option="byObject"/>
       </p:transition>
     </mc:Choice>
-    <mc:Fallback>
+    <mc:Fallback xmlns="">
       <p:transition spd="slow">
         <p:fade/>
       </p:transition>
@@ -5515,7 +5515,7 @@
           <a:p>
             <a:fld id="{F10E419D-85FE-481E-9CA3-93AB32482C82}" type="datetime1">
               <a:rPr lang="en-US" smtClean="0"/>
-              <a:t>12/20/2021</a:t>
+              <a:t>4/8/2022</a:t>
             </a:fld>
             <a:endParaRPr lang="en-US" dirty="0"/>
           </a:p>
@@ -5810,13 +5810,13 @@
   <p:clrMapOvr>
     <a:masterClrMapping/>
   </p:clrMapOvr>
-  <mc:AlternateContent xmlns:mc="http://schemas.openxmlformats.org/markup-compatibility/2006">
-    <mc:Choice xmlns:p159="http://schemas.microsoft.com/office/powerpoint/2015/09/main" Requires="p159">
+  <mc:AlternateContent xmlns:mc="http://schemas.openxmlformats.org/markup-compatibility/2006" xmlns:p159="http://schemas.microsoft.com/office/powerpoint/2015/09/main">
+    <mc:Choice Requires="p159">
       <p:transition xmlns:p14="http://schemas.microsoft.com/office/powerpoint/2010/main" spd="slow" p14:dur="2000">
         <p159:morph option="byObject"/>
       </p:transition>
     </mc:Choice>
-    <mc:Fallback>
+    <mc:Fallback xmlns="">
       <p:transition spd="slow">
         <p:fade/>
       </p:transition>
@@ -5960,7 +5960,7 @@
           <a:p>
             <a:fld id="{F1176794-D4B7-4DCF-B85D-48CF7452D2DD}" type="datetime1">
               <a:rPr lang="en-US" smtClean="0"/>
-              <a:t>12/20/2021</a:t>
+              <a:t>4/8/2022</a:t>
             </a:fld>
             <a:endParaRPr lang="en-US" dirty="0"/>
           </a:p>
@@ -6017,13 +6017,13 @@
   <p:clrMapOvr>
     <a:masterClrMapping/>
   </p:clrMapOvr>
-  <mc:AlternateContent xmlns:mc="http://schemas.openxmlformats.org/markup-compatibility/2006">
-    <mc:Choice xmlns:p159="http://schemas.microsoft.com/office/powerpoint/2015/09/main" Requires="p159">
+  <mc:AlternateContent xmlns:mc="http://schemas.openxmlformats.org/markup-compatibility/2006" xmlns:p159="http://schemas.microsoft.com/office/powerpoint/2015/09/main">
+    <mc:Choice Requires="p159">
       <p:transition xmlns:p14="http://schemas.microsoft.com/office/powerpoint/2010/main" spd="slow" p14:dur="2000">
         <p159:morph option="byObject"/>
       </p:transition>
     </mc:Choice>
-    <mc:Fallback>
+    <mc:Fallback xmlns="">
       <p:transition spd="slow">
         <p:fade/>
       </p:transition>
@@ -6517,7 +6517,7 @@
           <a:p>
             <a:fld id="{AD4965E0-7C0A-4A6C-BD9A-60BB7864F2AB}" type="datetime1">
               <a:rPr lang="en-US" smtClean="0"/>
-              <a:t>12/20/2021</a:t>
+              <a:t>4/8/2022</a:t>
             </a:fld>
             <a:endParaRPr lang="en-US" dirty="0"/>
           </a:p>
@@ -6574,13 +6574,13 @@
   <p:clrMapOvr>
     <a:masterClrMapping/>
   </p:clrMapOvr>
-  <mc:AlternateContent xmlns:mc="http://schemas.openxmlformats.org/markup-compatibility/2006">
-    <mc:Choice xmlns:p159="http://schemas.microsoft.com/office/powerpoint/2015/09/main" Requires="p159">
+  <mc:AlternateContent xmlns:mc="http://schemas.openxmlformats.org/markup-compatibility/2006" xmlns:p159="http://schemas.microsoft.com/office/powerpoint/2015/09/main">
+    <mc:Choice Requires="p159">
       <p:transition xmlns:p14="http://schemas.microsoft.com/office/powerpoint/2010/main" spd="slow" p14:dur="2000">
         <p159:morph option="byObject"/>
       </p:transition>
     </mc:Choice>
-    <mc:Fallback>
+    <mc:Fallback xmlns="">
       <p:transition spd="slow">
         <p:fade/>
       </p:transition>
@@ -7248,7 +7248,7 @@
           <a:p>
             <a:fld id="{315E82EF-50EE-4F73-AD2C-3353FDE924AD}" type="datetime1">
               <a:rPr lang="en-US" smtClean="0"/>
-              <a:t>12/20/2021</a:t>
+              <a:t>4/8/2022</a:t>
             </a:fld>
             <a:endParaRPr lang="en-US" dirty="0"/>
           </a:p>
@@ -7305,13 +7305,13 @@
   <p:clrMapOvr>
     <a:masterClrMapping/>
   </p:clrMapOvr>
-  <mc:AlternateContent xmlns:mc="http://schemas.openxmlformats.org/markup-compatibility/2006">
-    <mc:Choice xmlns:p159="http://schemas.microsoft.com/office/powerpoint/2015/09/main" Requires="p159">
+  <mc:AlternateContent xmlns:mc="http://schemas.openxmlformats.org/markup-compatibility/2006" xmlns:p159="http://schemas.microsoft.com/office/powerpoint/2015/09/main">
+    <mc:Choice Requires="p159">
       <p:transition xmlns:p14="http://schemas.microsoft.com/office/powerpoint/2010/main" spd="slow" p14:dur="2000">
         <p159:morph option="byObject"/>
       </p:transition>
     </mc:Choice>
-    <mc:Fallback>
+    <mc:Fallback xmlns="">
       <p:transition spd="slow">
         <p:fade/>
       </p:transition>
@@ -7429,7 +7429,7 @@
           <a:p>
             <a:fld id="{680D7965-F86D-4480-A6E0-5D2600F11F5B}" type="datetime1">
               <a:rPr lang="en-US" smtClean="0"/>
-              <a:t>12/20/2021</a:t>
+              <a:t>4/8/2022</a:t>
             </a:fld>
             <a:endParaRPr lang="en-US" dirty="0"/>
           </a:p>
@@ -7486,13 +7486,13 @@
   <p:clrMapOvr>
     <a:masterClrMapping/>
   </p:clrMapOvr>
-  <mc:AlternateContent xmlns:mc="http://schemas.openxmlformats.org/markup-compatibility/2006">
-    <mc:Choice xmlns:p159="http://schemas.microsoft.com/office/powerpoint/2015/09/main" Requires="p159">
+  <mc:AlternateContent xmlns:mc="http://schemas.openxmlformats.org/markup-compatibility/2006" xmlns:p159="http://schemas.microsoft.com/office/powerpoint/2015/09/main">
+    <mc:Choice Requires="p159">
       <p:transition xmlns:p14="http://schemas.microsoft.com/office/powerpoint/2010/main" spd="slow" p14:dur="2000">
         <p159:morph option="byObject"/>
       </p:transition>
     </mc:Choice>
-    <mc:Fallback>
+    <mc:Fallback xmlns="">
       <p:transition spd="slow">
         <p:fade/>
       </p:transition>
@@ -7620,7 +7620,7 @@
           <a:p>
             <a:fld id="{483C6FDE-0CAA-407D-BB1A-DC05A92AC078}" type="datetime1">
               <a:rPr lang="en-US" smtClean="0"/>
-              <a:t>12/20/2021</a:t>
+              <a:t>4/8/2022</a:t>
             </a:fld>
             <a:endParaRPr lang="en-US" dirty="0"/>
           </a:p>
@@ -7677,13 +7677,13 @@
   <p:clrMapOvr>
     <a:masterClrMapping/>
   </p:clrMapOvr>
-  <mc:AlternateContent xmlns:mc="http://schemas.openxmlformats.org/markup-compatibility/2006">
-    <mc:Choice xmlns:p159="http://schemas.microsoft.com/office/powerpoint/2015/09/main" Requires="p159">
+  <mc:AlternateContent xmlns:mc="http://schemas.openxmlformats.org/markup-compatibility/2006" xmlns:p159="http://schemas.microsoft.com/office/powerpoint/2015/09/main">
+    <mc:Choice Requires="p159">
       <p:transition xmlns:p14="http://schemas.microsoft.com/office/powerpoint/2010/main" spd="slow" p14:dur="2000">
         <p159:morph option="byObject"/>
       </p:transition>
     </mc:Choice>
-    <mc:Fallback>
+    <mc:Fallback xmlns="">
       <p:transition spd="slow">
         <p:fade/>
       </p:transition>
@@ -7801,7 +7801,7 @@
           <a:p>
             <a:fld id="{E32D5210-609C-4C85-8A84-948F16EE0FC5}" type="datetime1">
               <a:rPr lang="en-US" smtClean="0"/>
-              <a:t>12/20/2021</a:t>
+              <a:t>4/8/2022</a:t>
             </a:fld>
             <a:endParaRPr lang="en-US" dirty="0"/>
           </a:p>
@@ -7858,13 +7858,13 @@
   <p:clrMapOvr>
     <a:masterClrMapping/>
   </p:clrMapOvr>
-  <mc:AlternateContent xmlns:mc="http://schemas.openxmlformats.org/markup-compatibility/2006">
-    <mc:Choice xmlns:p159="http://schemas.microsoft.com/office/powerpoint/2015/09/main" Requires="p159">
+  <mc:AlternateContent xmlns:mc="http://schemas.openxmlformats.org/markup-compatibility/2006" xmlns:p159="http://schemas.microsoft.com/office/powerpoint/2015/09/main">
+    <mc:Choice Requires="p159">
       <p:transition xmlns:p14="http://schemas.microsoft.com/office/powerpoint/2010/main" spd="slow" p14:dur="2000">
         <p159:morph option="byObject"/>
       </p:transition>
     </mc:Choice>
-    <mc:Fallback>
+    <mc:Fallback xmlns="">
       <p:transition spd="slow">
         <p:fade/>
       </p:transition>
@@ -8062,7 +8062,7 @@
           <a:p>
             <a:fld id="{D9AB1C77-4052-4226-9AD7-3E0D06387D6C}" type="datetime1">
               <a:rPr lang="en-US" smtClean="0"/>
-              <a:t>12/20/2021</a:t>
+              <a:t>4/8/2022</a:t>
             </a:fld>
             <a:endParaRPr lang="en-US" dirty="0"/>
           </a:p>
@@ -8119,13 +8119,13 @@
   <p:clrMapOvr>
     <a:masterClrMapping/>
   </p:clrMapOvr>
-  <mc:AlternateContent xmlns:mc="http://schemas.openxmlformats.org/markup-compatibility/2006">
-    <mc:Choice xmlns:p159="http://schemas.microsoft.com/office/powerpoint/2015/09/main" Requires="p159">
+  <mc:AlternateContent xmlns:mc="http://schemas.openxmlformats.org/markup-compatibility/2006" xmlns:p159="http://schemas.microsoft.com/office/powerpoint/2015/09/main">
+    <mc:Choice Requires="p159">
       <p:transition xmlns:p14="http://schemas.microsoft.com/office/powerpoint/2010/main" spd="slow" p14:dur="2000">
         <p159:morph option="byObject"/>
       </p:transition>
     </mc:Choice>
-    <mc:Fallback>
+    <mc:Fallback xmlns="">
       <p:transition spd="slow">
         <p:fade/>
       </p:transition>
@@ -8305,7 +8305,7 @@
           <a:p>
             <a:fld id="{E023B883-9908-4998-A06A-1FFD382DD331}" type="datetime1">
               <a:rPr lang="en-US" smtClean="0"/>
-              <a:t>12/20/2021</a:t>
+              <a:t>4/8/2022</a:t>
             </a:fld>
             <a:endParaRPr lang="en-US" dirty="0"/>
           </a:p>
@@ -8362,13 +8362,13 @@
   <p:clrMapOvr>
     <a:masterClrMapping/>
   </p:clrMapOvr>
-  <mc:AlternateContent xmlns:mc="http://schemas.openxmlformats.org/markup-compatibility/2006">
-    <mc:Choice xmlns:p159="http://schemas.microsoft.com/office/powerpoint/2015/09/main" Requires="p159">
+  <mc:AlternateContent xmlns:mc="http://schemas.openxmlformats.org/markup-compatibility/2006" xmlns:p159="http://schemas.microsoft.com/office/powerpoint/2015/09/main">
+    <mc:Choice Requires="p159">
       <p:transition xmlns:p14="http://schemas.microsoft.com/office/powerpoint/2010/main" spd="slow" p14:dur="2000">
         <p159:morph option="byObject"/>
       </p:transition>
     </mc:Choice>
-    <mc:Fallback>
+    <mc:Fallback xmlns="">
       <p:transition spd="slow">
         <p:fade/>
       </p:transition>
@@ -8697,7 +8697,7 @@
           <a:p>
             <a:fld id="{48373728-21D3-4667-AE94-2D2FAE931E65}" type="datetime1">
               <a:rPr lang="en-US" smtClean="0"/>
-              <a:t>12/20/2021</a:t>
+              <a:t>4/8/2022</a:t>
             </a:fld>
             <a:endParaRPr lang="en-US" dirty="0"/>
           </a:p>
@@ -8754,13 +8754,13 @@
   <p:clrMapOvr>
     <a:masterClrMapping/>
   </p:clrMapOvr>
-  <mc:AlternateContent xmlns:mc="http://schemas.openxmlformats.org/markup-compatibility/2006">
-    <mc:Choice xmlns:p159="http://schemas.microsoft.com/office/powerpoint/2015/09/main" Requires="p159">
+  <mc:AlternateContent xmlns:mc="http://schemas.openxmlformats.org/markup-compatibility/2006" xmlns:p159="http://schemas.microsoft.com/office/powerpoint/2015/09/main">
+    <mc:Choice Requires="p159">
       <p:transition xmlns:p14="http://schemas.microsoft.com/office/powerpoint/2010/main" spd="slow" p14:dur="2000">
         <p159:morph option="byObject"/>
       </p:transition>
     </mc:Choice>
-    <mc:Fallback>
+    <mc:Fallback xmlns="">
       <p:transition spd="slow">
         <p:fade/>
       </p:transition>
@@ -8826,7 +8826,7 @@
           <a:p>
             <a:fld id="{15DD5671-455C-4B72-9246-49169A00C513}" type="datetime1">
               <a:rPr lang="en-US" smtClean="0"/>
-              <a:t>12/20/2021</a:t>
+              <a:t>4/8/2022</a:t>
             </a:fld>
             <a:endParaRPr lang="en-US" dirty="0"/>
           </a:p>
@@ -8883,13 +8883,13 @@
   <p:clrMapOvr>
     <a:masterClrMapping/>
   </p:clrMapOvr>
-  <mc:AlternateContent xmlns:mc="http://schemas.openxmlformats.org/markup-compatibility/2006">
-    <mc:Choice xmlns:p159="http://schemas.microsoft.com/office/powerpoint/2015/09/main" Requires="p159">
+  <mc:AlternateContent xmlns:mc="http://schemas.openxmlformats.org/markup-compatibility/2006" xmlns:p159="http://schemas.microsoft.com/office/powerpoint/2015/09/main">
+    <mc:Choice Requires="p159">
       <p:transition xmlns:p14="http://schemas.microsoft.com/office/powerpoint/2010/main" spd="slow" p14:dur="2000">
         <p159:morph option="byObject"/>
       </p:transition>
     </mc:Choice>
-    <mc:Fallback>
+    <mc:Fallback xmlns="">
       <p:transition spd="slow">
         <p:fade/>
       </p:transition>
@@ -8932,7 +8932,7 @@
           <a:p>
             <a:fld id="{A7D226AE-CC43-4AAA-9757-98149613D138}" type="datetime1">
               <a:rPr lang="en-US" smtClean="0"/>
-              <a:t>12/20/2021</a:t>
+              <a:t>4/8/2022</a:t>
             </a:fld>
             <a:endParaRPr lang="en-US" dirty="0"/>
           </a:p>
@@ -8989,13 +8989,13 @@
   <p:clrMapOvr>
     <a:masterClrMapping/>
   </p:clrMapOvr>
-  <mc:AlternateContent xmlns:mc="http://schemas.openxmlformats.org/markup-compatibility/2006">
-    <mc:Choice xmlns:p159="http://schemas.microsoft.com/office/powerpoint/2015/09/main" Requires="p159">
+  <mc:AlternateContent xmlns:mc="http://schemas.openxmlformats.org/markup-compatibility/2006" xmlns:p159="http://schemas.microsoft.com/office/powerpoint/2015/09/main">
+    <mc:Choice Requires="p159">
       <p:transition xmlns:p14="http://schemas.microsoft.com/office/powerpoint/2010/main" spd="slow" p14:dur="2000">
         <p159:morph option="byObject"/>
       </p:transition>
     </mc:Choice>
-    <mc:Fallback>
+    <mc:Fallback xmlns="">
       <p:transition spd="slow">
         <p:fade/>
       </p:transition>
@@ -9192,7 +9192,7 @@
           <a:p>
             <a:fld id="{C20E4E8A-CF1E-4ACF-BB0C-718C33517DA5}" type="datetime1">
               <a:rPr lang="en-US" smtClean="0"/>
-              <a:t>12/20/2021</a:t>
+              <a:t>4/8/2022</a:t>
             </a:fld>
             <a:endParaRPr lang="en-US" dirty="0"/>
           </a:p>
@@ -9249,13 +9249,13 @@
   <p:clrMapOvr>
     <a:masterClrMapping/>
   </p:clrMapOvr>
-  <mc:AlternateContent xmlns:mc="http://schemas.openxmlformats.org/markup-compatibility/2006">
-    <mc:Choice xmlns:p159="http://schemas.microsoft.com/office/powerpoint/2015/09/main" Requires="p159">
+  <mc:AlternateContent xmlns:mc="http://schemas.openxmlformats.org/markup-compatibility/2006" xmlns:p159="http://schemas.microsoft.com/office/powerpoint/2015/09/main">
+    <mc:Choice Requires="p159">
       <p:transition xmlns:p14="http://schemas.microsoft.com/office/powerpoint/2010/main" spd="slow" p14:dur="2000">
         <p159:morph option="byObject"/>
       </p:transition>
     </mc:Choice>
-    <mc:Fallback>
+    <mc:Fallback xmlns="">
       <p:transition spd="slow">
         <p:fade/>
       </p:transition>
@@ -9483,7 +9483,7 @@
           <a:p>
             <a:fld id="{BEF07F80-F1AD-46EE-8A39-822BCBBFBE85}" type="datetime1">
               <a:rPr lang="en-US" smtClean="0"/>
-              <a:t>12/20/2021</a:t>
+              <a:t>4/8/2022</a:t>
             </a:fld>
             <a:endParaRPr lang="en-US" dirty="0"/>
           </a:p>
@@ -9540,13 +9540,13 @@
   <p:clrMapOvr>
     <a:masterClrMapping/>
   </p:clrMapOvr>
-  <mc:AlternateContent xmlns:mc="http://schemas.openxmlformats.org/markup-compatibility/2006">
-    <mc:Choice xmlns:p159="http://schemas.microsoft.com/office/powerpoint/2015/09/main" Requires="p159">
+  <mc:AlternateContent xmlns:mc="http://schemas.openxmlformats.org/markup-compatibility/2006" xmlns:p159="http://schemas.microsoft.com/office/powerpoint/2015/09/main">
+    <mc:Choice Requires="p159">
       <p:transition xmlns:p14="http://schemas.microsoft.com/office/powerpoint/2010/main" spd="slow" p14:dur="2000">
         <p159:morph option="byObject"/>
       </p:transition>
     </mc:Choice>
-    <mc:Fallback>
+    <mc:Fallback xmlns="">
       <p:transition spd="slow">
         <p:fade/>
       </p:transition>
@@ -9617,7 +9617,7 @@
           <a:noFill/>
           <a:extLst>
             <a:ext uri="{909E8E84-426E-40dd-AFC4-6F175D3DCCD1}">
-              <a14:hiddenFill xmlns="" xmlns:a14="http://schemas.microsoft.com/office/drawing/2010/main">
+              <a14:hiddenFill xmlns:a14="http://schemas.microsoft.com/office/drawing/2010/main" xmlns="">
                 <a:solidFill>
                   <a:srgbClr val="FFFFFF"/>
                 </a:solidFill>
@@ -9691,7 +9691,7 @@
               </a:ln>
               <a:extLst>
                 <a:ext uri="{91240B29-F687-4f45-9708-019B960494DF}">
-                  <a14:hiddenLine xmlns="" xmlns:a14="http://schemas.microsoft.com/office/drawing/2010/main" w="9525">
+                  <a14:hiddenLine xmlns:a14="http://schemas.microsoft.com/office/drawing/2010/main" xmlns="" w="9525">
                     <a:solidFill>
                       <a:srgbClr val="000000"/>
                     </a:solidFill>
@@ -9781,7 +9781,7 @@
               </a:ln>
               <a:extLst>
                 <a:ext uri="{91240B29-F687-4f45-9708-019B960494DF}">
-                  <a14:hiddenLine xmlns="" xmlns:a14="http://schemas.microsoft.com/office/drawing/2010/main" w="9525">
+                  <a14:hiddenLine xmlns:a14="http://schemas.microsoft.com/office/drawing/2010/main" xmlns="" w="9525">
                     <a:solidFill>
                       <a:srgbClr val="000000"/>
                     </a:solidFill>
@@ -9871,7 +9871,7 @@
               </a:ln>
               <a:extLst>
                 <a:ext uri="{91240B29-F687-4f45-9708-019B960494DF}">
-                  <a14:hiddenLine xmlns="" xmlns:a14="http://schemas.microsoft.com/office/drawing/2010/main" w="9525">
+                  <a14:hiddenLine xmlns:a14="http://schemas.microsoft.com/office/drawing/2010/main" xmlns="" w="9525">
                     <a:solidFill>
                       <a:srgbClr val="000000"/>
                     </a:solidFill>
@@ -9933,7 +9933,7 @@
               </a:ln>
               <a:extLst>
                 <a:ext uri="{91240B29-F687-4f45-9708-019B960494DF}">
-                  <a14:hiddenLine xmlns="" xmlns:a14="http://schemas.microsoft.com/office/drawing/2010/main" w="9525">
+                  <a14:hiddenLine xmlns:a14="http://schemas.microsoft.com/office/drawing/2010/main" xmlns="" w="9525">
                     <a:solidFill>
                       <a:srgbClr val="000000"/>
                     </a:solidFill>
@@ -10023,7 +10023,7 @@
               </a:ln>
               <a:extLst>
                 <a:ext uri="{91240B29-F687-4f45-9708-019B960494DF}">
-                  <a14:hiddenLine xmlns="" xmlns:a14="http://schemas.microsoft.com/office/drawing/2010/main" w="9525">
+                  <a14:hiddenLine xmlns:a14="http://schemas.microsoft.com/office/drawing/2010/main" xmlns="" w="9525">
                     <a:solidFill>
                       <a:srgbClr val="000000"/>
                     </a:solidFill>
@@ -10085,7 +10085,7 @@
               </a:ln>
               <a:extLst>
                 <a:ext uri="{91240B29-F687-4f45-9708-019B960494DF}">
-                  <a14:hiddenLine xmlns="" xmlns:a14="http://schemas.microsoft.com/office/drawing/2010/main" w="9525">
+                  <a14:hiddenLine xmlns:a14="http://schemas.microsoft.com/office/drawing/2010/main" xmlns="" w="9525">
                     <a:solidFill>
                       <a:srgbClr val="000000"/>
                     </a:solidFill>
@@ -10147,7 +10147,7 @@
               </a:ln>
               <a:extLst>
                 <a:ext uri="{91240B29-F687-4f45-9708-019B960494DF}">
-                  <a14:hiddenLine xmlns="" xmlns:a14="http://schemas.microsoft.com/office/drawing/2010/main" w="9525">
+                  <a14:hiddenLine xmlns:a14="http://schemas.microsoft.com/office/drawing/2010/main" xmlns="" w="9525">
                     <a:solidFill>
                       <a:srgbClr val="000000"/>
                     </a:solidFill>
@@ -10237,7 +10237,7 @@
               </a:ln>
               <a:extLst>
                 <a:ext uri="{91240B29-F687-4f45-9708-019B960494DF}">
-                  <a14:hiddenLine xmlns="" xmlns:a14="http://schemas.microsoft.com/office/drawing/2010/main" w="9525">
+                  <a14:hiddenLine xmlns:a14="http://schemas.microsoft.com/office/drawing/2010/main" xmlns="" w="9525">
                     <a:solidFill>
                       <a:srgbClr val="000000"/>
                     </a:solidFill>
@@ -10327,7 +10327,7 @@
               </a:ln>
               <a:extLst>
                 <a:ext uri="{91240B29-F687-4f45-9708-019B960494DF}">
-                  <a14:hiddenLine xmlns="" xmlns:a14="http://schemas.microsoft.com/office/drawing/2010/main" w="9525">
+                  <a14:hiddenLine xmlns:a14="http://schemas.microsoft.com/office/drawing/2010/main" xmlns="" w="9525">
                     <a:solidFill>
                       <a:srgbClr val="000000"/>
                     </a:solidFill>
@@ -10389,7 +10389,7 @@
               </a:ln>
               <a:extLst>
                 <a:ext uri="{91240B29-F687-4f45-9708-019B960494DF}">
-                  <a14:hiddenLine xmlns="" xmlns:a14="http://schemas.microsoft.com/office/drawing/2010/main" w="9525">
+                  <a14:hiddenLine xmlns:a14="http://schemas.microsoft.com/office/drawing/2010/main" xmlns="" w="9525">
                     <a:solidFill>
                       <a:srgbClr val="000000"/>
                     </a:solidFill>
@@ -10499,7 +10499,7 @@
               </a:ln>
               <a:extLst>
                 <a:ext uri="{91240B29-F687-4f45-9708-019B960494DF}">
-                  <a14:hiddenLine xmlns="" xmlns:a14="http://schemas.microsoft.com/office/drawing/2010/main" w="9525">
+                  <a14:hiddenLine xmlns:a14="http://schemas.microsoft.com/office/drawing/2010/main" xmlns="" w="9525">
                     <a:solidFill>
                       <a:srgbClr val="000000"/>
                     </a:solidFill>
@@ -10583,7 +10583,7 @@
               </a:ln>
               <a:extLst>
                 <a:ext uri="{91240B29-F687-4f45-9708-019B960494DF}">
-                  <a14:hiddenLine xmlns="" xmlns:a14="http://schemas.microsoft.com/office/drawing/2010/main" w="9525">
+                  <a14:hiddenLine xmlns:a14="http://schemas.microsoft.com/office/drawing/2010/main" xmlns="" w="9525">
                     <a:solidFill>
                       <a:srgbClr val="000000"/>
                     </a:solidFill>
@@ -10645,7 +10645,7 @@
               </a:ln>
               <a:extLst>
                 <a:ext uri="{91240B29-F687-4f45-9708-019B960494DF}">
-                  <a14:hiddenLine xmlns="" xmlns:a14="http://schemas.microsoft.com/office/drawing/2010/main" w="9525">
+                  <a14:hiddenLine xmlns:a14="http://schemas.microsoft.com/office/drawing/2010/main" xmlns="" w="9525">
                     <a:solidFill>
                       <a:srgbClr val="000000"/>
                     </a:solidFill>
@@ -10707,7 +10707,7 @@
               </a:ln>
               <a:extLst>
                 <a:ext uri="{91240B29-F687-4f45-9708-019B960494DF}">
-                  <a14:hiddenLine xmlns="" xmlns:a14="http://schemas.microsoft.com/office/drawing/2010/main" w="9525">
+                  <a14:hiddenLine xmlns:a14="http://schemas.microsoft.com/office/drawing/2010/main" xmlns="" w="9525">
                     <a:solidFill>
                       <a:srgbClr val="000000"/>
                     </a:solidFill>
@@ -10797,7 +10797,7 @@
               </a:ln>
               <a:extLst>
                 <a:ext uri="{91240B29-F687-4f45-9708-019B960494DF}">
-                  <a14:hiddenLine xmlns="" xmlns:a14="http://schemas.microsoft.com/office/drawing/2010/main" w="9525">
+                  <a14:hiddenLine xmlns:a14="http://schemas.microsoft.com/office/drawing/2010/main" xmlns="" w="9525">
                     <a:solidFill>
                       <a:srgbClr val="000000"/>
                     </a:solidFill>
@@ -10831,7 +10831,7 @@
               </a:ln>
               <a:extLst>
                 <a:ext uri="{91240B29-F687-4f45-9708-019B960494DF}">
-                  <a14:hiddenLine xmlns="" xmlns:a14="http://schemas.microsoft.com/office/drawing/2010/main" w="9525">
+                  <a14:hiddenLine xmlns:a14="http://schemas.microsoft.com/office/drawing/2010/main" xmlns="" w="9525">
                     <a:solidFill>
                       <a:srgbClr val="000000"/>
                     </a:solidFill>
@@ -10896,7 +10896,7 @@
               </a:ln>
               <a:extLst>
                 <a:ext uri="{91240B29-F687-4f45-9708-019B960494DF}">
-                  <a14:hiddenLine xmlns="" xmlns:a14="http://schemas.microsoft.com/office/drawing/2010/main" w="9525">
+                  <a14:hiddenLine xmlns:a14="http://schemas.microsoft.com/office/drawing/2010/main" xmlns="" w="9525">
                     <a:solidFill>
                       <a:srgbClr val="000000"/>
                     </a:solidFill>
@@ -10986,7 +10986,7 @@
               </a:ln>
               <a:extLst>
                 <a:ext uri="{91240B29-F687-4f45-9708-019B960494DF}">
-                  <a14:hiddenLine xmlns="" xmlns:a14="http://schemas.microsoft.com/office/drawing/2010/main" w="9525">
+                  <a14:hiddenLine xmlns:a14="http://schemas.microsoft.com/office/drawing/2010/main" xmlns="" w="9525">
                     <a:solidFill>
                       <a:srgbClr val="000000"/>
                     </a:solidFill>
@@ -11048,7 +11048,7 @@
               </a:ln>
               <a:extLst>
                 <a:ext uri="{91240B29-F687-4f45-9708-019B960494DF}">
-                  <a14:hiddenLine xmlns="" xmlns:a14="http://schemas.microsoft.com/office/drawing/2010/main" w="9525">
+                  <a14:hiddenLine xmlns:a14="http://schemas.microsoft.com/office/drawing/2010/main" xmlns="" w="9525">
                     <a:solidFill>
                       <a:srgbClr val="000000"/>
                     </a:solidFill>
@@ -11138,7 +11138,7 @@
               </a:ln>
               <a:extLst>
                 <a:ext uri="{91240B29-F687-4f45-9708-019B960494DF}">
-                  <a14:hiddenLine xmlns="" xmlns:a14="http://schemas.microsoft.com/office/drawing/2010/main" w="9525">
+                  <a14:hiddenLine xmlns:a14="http://schemas.microsoft.com/office/drawing/2010/main" xmlns="" w="9525">
                     <a:solidFill>
                       <a:srgbClr val="000000"/>
                     </a:solidFill>
@@ -11203,7 +11203,7 @@
               </a:ln>
               <a:extLst>
                 <a:ext uri="{91240B29-F687-4f45-9708-019B960494DF}">
-                  <a14:hiddenLine xmlns="" xmlns:a14="http://schemas.microsoft.com/office/drawing/2010/main" w="9525">
+                  <a14:hiddenLine xmlns:a14="http://schemas.microsoft.com/office/drawing/2010/main" xmlns="" w="9525">
                     <a:solidFill>
                       <a:srgbClr val="000000"/>
                     </a:solidFill>
@@ -11265,7 +11265,7 @@
               </a:ln>
               <a:extLst>
                 <a:ext uri="{91240B29-F687-4f45-9708-019B960494DF}">
-                  <a14:hiddenLine xmlns="" xmlns:a14="http://schemas.microsoft.com/office/drawing/2010/main" w="9525">
+                  <a14:hiddenLine xmlns:a14="http://schemas.microsoft.com/office/drawing/2010/main" xmlns="" w="9525">
                     <a:solidFill>
                       <a:srgbClr val="000000"/>
                     </a:solidFill>
@@ -11355,7 +11355,7 @@
               </a:ln>
               <a:extLst>
                 <a:ext uri="{91240B29-F687-4f45-9708-019B960494DF}">
-                  <a14:hiddenLine xmlns="" xmlns:a14="http://schemas.microsoft.com/office/drawing/2010/main" w="9525">
+                  <a14:hiddenLine xmlns:a14="http://schemas.microsoft.com/office/drawing/2010/main" xmlns="" w="9525">
                     <a:solidFill>
                       <a:srgbClr val="000000"/>
                     </a:solidFill>
@@ -11445,7 +11445,7 @@
               </a:ln>
               <a:extLst>
                 <a:ext uri="{91240B29-F687-4f45-9708-019B960494DF}">
-                  <a14:hiddenLine xmlns="" xmlns:a14="http://schemas.microsoft.com/office/drawing/2010/main" w="9525">
+                  <a14:hiddenLine xmlns:a14="http://schemas.microsoft.com/office/drawing/2010/main" xmlns="" w="9525">
                     <a:solidFill>
                       <a:srgbClr val="000000"/>
                     </a:solidFill>
@@ -11510,7 +11510,7 @@
               </a:ln>
               <a:extLst>
                 <a:ext uri="{91240B29-F687-4f45-9708-019B960494DF}">
-                  <a14:hiddenLine xmlns="" xmlns:a14="http://schemas.microsoft.com/office/drawing/2010/main" w="9525">
+                  <a14:hiddenLine xmlns:a14="http://schemas.microsoft.com/office/drawing/2010/main" xmlns="" w="9525">
                     <a:solidFill>
                       <a:srgbClr val="000000"/>
                     </a:solidFill>
@@ -11630,7 +11630,7 @@
               </a:ln>
               <a:extLst>
                 <a:ext uri="{91240B29-F687-4f45-9708-019B960494DF}">
-                  <a14:hiddenLine xmlns="" xmlns:a14="http://schemas.microsoft.com/office/drawing/2010/main" w="9525">
+                  <a14:hiddenLine xmlns:a14="http://schemas.microsoft.com/office/drawing/2010/main" xmlns="" w="9525">
                     <a:solidFill>
                       <a:srgbClr val="000000"/>
                     </a:solidFill>
@@ -11711,7 +11711,7 @@
               </a:ln>
               <a:extLst>
                 <a:ext uri="{91240B29-F687-4f45-9708-019B960494DF}">
-                  <a14:hiddenLine xmlns="" xmlns:a14="http://schemas.microsoft.com/office/drawing/2010/main" w="9525">
+                  <a14:hiddenLine xmlns:a14="http://schemas.microsoft.com/office/drawing/2010/main" xmlns="" w="9525">
                     <a:solidFill>
                       <a:srgbClr val="000000"/>
                     </a:solidFill>
@@ -11826,7 +11826,7 @@
               </a:ln>
               <a:extLst>
                 <a:ext uri="{91240B29-F687-4f45-9708-019B960494DF}">
-                  <a14:hiddenLine xmlns="" xmlns:a14="http://schemas.microsoft.com/office/drawing/2010/main" w="9525">
+                  <a14:hiddenLine xmlns:a14="http://schemas.microsoft.com/office/drawing/2010/main" xmlns="" w="9525">
                     <a:solidFill>
                       <a:srgbClr val="000000"/>
                     </a:solidFill>
@@ -11916,7 +11916,7 @@
               </a:ln>
               <a:extLst>
                 <a:ext uri="{91240B29-F687-4f45-9708-019B960494DF}">
-                  <a14:hiddenLine xmlns="" xmlns:a14="http://schemas.microsoft.com/office/drawing/2010/main" w="9525">
+                  <a14:hiddenLine xmlns:a14="http://schemas.microsoft.com/office/drawing/2010/main" xmlns="" w="9525">
                     <a:solidFill>
                       <a:srgbClr val="000000"/>
                     </a:solidFill>
@@ -11981,7 +11981,7 @@
               </a:ln>
               <a:extLst>
                 <a:ext uri="{91240B29-F687-4f45-9708-019B960494DF}">
-                  <a14:hiddenLine xmlns="" xmlns:a14="http://schemas.microsoft.com/office/drawing/2010/main" w="9525">
+                  <a14:hiddenLine xmlns:a14="http://schemas.microsoft.com/office/drawing/2010/main" xmlns="" w="9525">
                     <a:solidFill>
                       <a:srgbClr val="000000"/>
                     </a:solidFill>
@@ -12071,7 +12071,7 @@
               </a:ln>
               <a:extLst>
                 <a:ext uri="{91240B29-F687-4f45-9708-019B960494DF}">
-                  <a14:hiddenLine xmlns="" xmlns:a14="http://schemas.microsoft.com/office/drawing/2010/main" w="9525">
+                  <a14:hiddenLine xmlns:a14="http://schemas.microsoft.com/office/drawing/2010/main" xmlns="" w="9525">
                     <a:solidFill>
                       <a:srgbClr val="000000"/>
                     </a:solidFill>
@@ -12139,7 +12139,7 @@
               </a:ln>
               <a:extLst>
                 <a:ext uri="{91240B29-F687-4f45-9708-019B960494DF}">
-                  <a14:hiddenLine xmlns="" xmlns:a14="http://schemas.microsoft.com/office/drawing/2010/main" w="9525">
+                  <a14:hiddenLine xmlns:a14="http://schemas.microsoft.com/office/drawing/2010/main" xmlns="" w="9525">
                     <a:solidFill>
                       <a:srgbClr val="000000"/>
                     </a:solidFill>
@@ -12229,7 +12229,7 @@
               </a:ln>
               <a:extLst>
                 <a:ext uri="{91240B29-F687-4f45-9708-019B960494DF}">
-                  <a14:hiddenLine xmlns="" xmlns:a14="http://schemas.microsoft.com/office/drawing/2010/main" w="9525">
+                  <a14:hiddenLine xmlns:a14="http://schemas.microsoft.com/office/drawing/2010/main" xmlns="" w="9525">
                     <a:solidFill>
                       <a:srgbClr val="000000"/>
                     </a:solidFill>
@@ -12297,7 +12297,7 @@
               </a:ln>
               <a:extLst>
                 <a:ext uri="{91240B29-F687-4f45-9708-019B960494DF}">
-                  <a14:hiddenLine xmlns="" xmlns:a14="http://schemas.microsoft.com/office/drawing/2010/main" w="9525">
+                  <a14:hiddenLine xmlns:a14="http://schemas.microsoft.com/office/drawing/2010/main" xmlns="" w="9525">
                     <a:solidFill>
                       <a:srgbClr val="000000"/>
                     </a:solidFill>
@@ -12387,7 +12387,7 @@
               </a:ln>
               <a:extLst>
                 <a:ext uri="{91240B29-F687-4f45-9708-019B960494DF}">
-                  <a14:hiddenLine xmlns="" xmlns:a14="http://schemas.microsoft.com/office/drawing/2010/main" w="9525">
+                  <a14:hiddenLine xmlns:a14="http://schemas.microsoft.com/office/drawing/2010/main" xmlns="" w="9525">
                     <a:solidFill>
                       <a:srgbClr val="000000"/>
                     </a:solidFill>
@@ -12421,7 +12421,7 @@
               </a:ln>
               <a:extLst>
                 <a:ext uri="{91240B29-F687-4f45-9708-019B960494DF}">
-                  <a14:hiddenLine xmlns="" xmlns:a14="http://schemas.microsoft.com/office/drawing/2010/main" w="9525">
+                  <a14:hiddenLine xmlns:a14="http://schemas.microsoft.com/office/drawing/2010/main" xmlns="" w="9525">
                     <a:solidFill>
                       <a:srgbClr val="000000"/>
                     </a:solidFill>
@@ -12561,7 +12561,7 @@
           <a:p>
             <a:fld id="{768F54EA-B865-467F-AF1D-5CBFCA01F7EC}" type="datetime1">
               <a:rPr lang="en-US" smtClean="0"/>
-              <a:t>12/20/2021</a:t>
+              <a:t>4/8/2022</a:t>
             </a:fld>
             <a:endParaRPr lang="en-US" dirty="0"/>
           </a:p>
@@ -12672,13 +12672,13 @@
     <p:sldLayoutId id="2147483658" r:id="rId16"/>
     <p:sldLayoutId id="2147483659" r:id="rId17"/>
   </p:sldLayoutIdLst>
-  <mc:AlternateContent xmlns:mc="http://schemas.openxmlformats.org/markup-compatibility/2006">
-    <mc:Choice xmlns:p159="http://schemas.microsoft.com/office/powerpoint/2015/09/main" Requires="p159">
+  <mc:AlternateContent xmlns:mc="http://schemas.openxmlformats.org/markup-compatibility/2006" xmlns:p159="http://schemas.microsoft.com/office/powerpoint/2015/09/main">
+    <mc:Choice Requires="p159">
       <p:transition xmlns:p14="http://schemas.microsoft.com/office/powerpoint/2010/main" spd="slow" p14:dur="2000">
         <p159:morph option="byObject"/>
       </p:transition>
     </mc:Choice>
-    <mc:Fallback>
+    <mc:Fallback xmlns="">
       <p:transition spd="slow">
         <p:fade/>
       </p:transition>
@@ -13139,13 +13139,13 @@
   <p:clrMapOvr>
     <a:masterClrMapping/>
   </p:clrMapOvr>
-  <mc:AlternateContent xmlns:mc="http://schemas.openxmlformats.org/markup-compatibility/2006">
-    <mc:Choice xmlns:p159="http://schemas.microsoft.com/office/powerpoint/2015/09/main" Requires="p159">
+  <mc:AlternateContent xmlns:mc="http://schemas.openxmlformats.org/markup-compatibility/2006" xmlns:p159="http://schemas.microsoft.com/office/powerpoint/2015/09/main">
+    <mc:Choice Requires="p159">
       <p:transition xmlns:p14="http://schemas.microsoft.com/office/powerpoint/2010/main" spd="slow" p14:dur="2000">
         <p159:morph option="byObject"/>
       </p:transition>
     </mc:Choice>
-    <mc:Fallback>
+    <mc:Fallback xmlns="">
       <p:transition spd="slow">
         <p:fade/>
       </p:transition>
@@ -13322,13 +13322,13 @@
   <p:clrMapOvr>
     <a:masterClrMapping/>
   </p:clrMapOvr>
-  <mc:AlternateContent xmlns:mc="http://schemas.openxmlformats.org/markup-compatibility/2006">
-    <mc:Choice xmlns:p159="http://schemas.microsoft.com/office/powerpoint/2015/09/main" Requires="p159">
+  <mc:AlternateContent xmlns:mc="http://schemas.openxmlformats.org/markup-compatibility/2006" xmlns:p159="http://schemas.microsoft.com/office/powerpoint/2015/09/main">
+    <mc:Choice Requires="p159">
       <p:transition xmlns:p14="http://schemas.microsoft.com/office/powerpoint/2010/main" spd="slow" p14:dur="2000">
         <p159:morph option="byObject"/>
       </p:transition>
     </mc:Choice>
-    <mc:Fallback>
+    <mc:Fallback xmlns="">
       <p:transition spd="slow">
         <p:fade/>
       </p:transition>
@@ -13531,13 +13531,13 @@
   <p:clrMapOvr>
     <a:masterClrMapping/>
   </p:clrMapOvr>
-  <mc:AlternateContent xmlns:mc="http://schemas.openxmlformats.org/markup-compatibility/2006">
-    <mc:Choice xmlns:p159="http://schemas.microsoft.com/office/powerpoint/2015/09/main" Requires="p159">
+  <mc:AlternateContent xmlns:mc="http://schemas.openxmlformats.org/markup-compatibility/2006" xmlns:p159="http://schemas.microsoft.com/office/powerpoint/2015/09/main">
+    <mc:Choice Requires="p159">
       <p:transition xmlns:p14="http://schemas.microsoft.com/office/powerpoint/2010/main" spd="slow" p14:dur="2000">
         <p159:morph option="byObject"/>
       </p:transition>
     </mc:Choice>
-    <mc:Fallback>
+    <mc:Fallback xmlns="">
       <p:transition spd="slow">
         <p:fade/>
       </p:transition>
@@ -13929,13 +13929,13 @@
   <p:clrMapOvr>
     <a:masterClrMapping/>
   </p:clrMapOvr>
-  <mc:AlternateContent xmlns:mc="http://schemas.openxmlformats.org/markup-compatibility/2006">
-    <mc:Choice xmlns:p159="http://schemas.microsoft.com/office/powerpoint/2015/09/main" Requires="p159">
+  <mc:AlternateContent xmlns:mc="http://schemas.openxmlformats.org/markup-compatibility/2006" xmlns:p159="http://schemas.microsoft.com/office/powerpoint/2015/09/main">
+    <mc:Choice Requires="p159">
       <p:transition xmlns:p14="http://schemas.microsoft.com/office/powerpoint/2010/main" spd="slow" p14:dur="2000">
         <p159:morph option="byObject"/>
       </p:transition>
     </mc:Choice>
-    <mc:Fallback>
+    <mc:Fallback xmlns="">
       <p:transition spd="slow">
         <p:fade/>
       </p:transition>
@@ -14467,13 +14467,13 @@
   <p:clrMapOvr>
     <a:masterClrMapping/>
   </p:clrMapOvr>
-  <mc:AlternateContent xmlns:mc="http://schemas.openxmlformats.org/markup-compatibility/2006">
-    <mc:Choice xmlns:p159="http://schemas.microsoft.com/office/powerpoint/2015/09/main" Requires="p159">
+  <mc:AlternateContent xmlns:mc="http://schemas.openxmlformats.org/markup-compatibility/2006" xmlns:p159="http://schemas.microsoft.com/office/powerpoint/2015/09/main">
+    <mc:Choice Requires="p159">
       <p:transition xmlns:p14="http://schemas.microsoft.com/office/powerpoint/2010/main" spd="slow" p14:dur="2000">
         <p159:morph option="byObject"/>
       </p:transition>
     </mc:Choice>
-    <mc:Fallback>
+    <mc:Fallback xmlns="">
       <p:transition spd="slow">
         <p:fade/>
       </p:transition>
@@ -14762,13 +14762,13 @@
   <p:clrMapOvr>
     <a:masterClrMapping/>
   </p:clrMapOvr>
-  <mc:AlternateContent xmlns:mc="http://schemas.openxmlformats.org/markup-compatibility/2006">
-    <mc:Choice xmlns:p159="http://schemas.microsoft.com/office/powerpoint/2015/09/main" Requires="p159">
+  <mc:AlternateContent xmlns:mc="http://schemas.openxmlformats.org/markup-compatibility/2006" xmlns:p159="http://schemas.microsoft.com/office/powerpoint/2015/09/main">
+    <mc:Choice Requires="p159">
       <p:transition xmlns:p14="http://schemas.microsoft.com/office/powerpoint/2010/main" spd="slow" p14:dur="2000">
         <p159:morph option="byObject"/>
       </p:transition>
     </mc:Choice>
-    <mc:Fallback>
+    <mc:Fallback xmlns="">
       <p:transition spd="slow">
         <p:fade/>
       </p:transition>
@@ -15258,13 +15258,13 @@
   <p:clrMapOvr>
     <a:masterClrMapping/>
   </p:clrMapOvr>
-  <mc:AlternateContent xmlns:mc="http://schemas.openxmlformats.org/markup-compatibility/2006">
-    <mc:Choice xmlns:p159="http://schemas.microsoft.com/office/powerpoint/2015/09/main" Requires="p159">
+  <mc:AlternateContent xmlns:mc="http://schemas.openxmlformats.org/markup-compatibility/2006" xmlns:p159="http://schemas.microsoft.com/office/powerpoint/2015/09/main">
+    <mc:Choice Requires="p159">
       <p:transition xmlns:p14="http://schemas.microsoft.com/office/powerpoint/2010/main" spd="slow" p14:dur="2000">
         <p159:morph option="byObject"/>
       </p:transition>
     </mc:Choice>
-    <mc:Fallback>
+    <mc:Fallback xmlns="">
       <p:transition spd="slow">
         <p:fade/>
       </p:transition>
@@ -15645,13 +15645,13 @@
   <p:clrMapOvr>
     <a:masterClrMapping/>
   </p:clrMapOvr>
-  <mc:AlternateContent xmlns:mc="http://schemas.openxmlformats.org/markup-compatibility/2006">
-    <mc:Choice xmlns:p159="http://schemas.microsoft.com/office/powerpoint/2015/09/main" Requires="p159">
+  <mc:AlternateContent xmlns:mc="http://schemas.openxmlformats.org/markup-compatibility/2006" xmlns:p159="http://schemas.microsoft.com/office/powerpoint/2015/09/main">
+    <mc:Choice Requires="p159">
       <p:transition xmlns:p14="http://schemas.microsoft.com/office/powerpoint/2010/main" spd="slow" p14:dur="2000">
         <p159:morph option="byObject"/>
       </p:transition>
     </mc:Choice>
-    <mc:Fallback>
+    <mc:Fallback xmlns="">
       <p:transition spd="slow">
         <p:fade/>
       </p:transition>
@@ -15788,13 +15788,13 @@
   <p:clrMapOvr>
     <a:masterClrMapping/>
   </p:clrMapOvr>
-  <mc:AlternateContent xmlns:mc="http://schemas.openxmlformats.org/markup-compatibility/2006">
-    <mc:Choice xmlns:p159="http://schemas.microsoft.com/office/powerpoint/2015/09/main" Requires="p159">
+  <mc:AlternateContent xmlns:mc="http://schemas.openxmlformats.org/markup-compatibility/2006" xmlns:p159="http://schemas.microsoft.com/office/powerpoint/2015/09/main">
+    <mc:Choice Requires="p159">
       <p:transition xmlns:p14="http://schemas.microsoft.com/office/powerpoint/2010/main" spd="slow" p14:dur="2000">
         <p159:morph option="byObject"/>
       </p:transition>
     </mc:Choice>
-    <mc:Fallback>
+    <mc:Fallback xmlns="">
       <p:transition spd="slow">
         <p:fade/>
       </p:transition>
@@ -16007,7 +16007,7 @@
         </p:nvSpPr>
         <p:spPr>
           <a:xfrm>
-            <a:off x="1141412" y="1248117"/>
+            <a:off x="1198668" y="1248116"/>
             <a:ext cx="3916364" cy="1781176"/>
           </a:xfrm>
           <a:prstGeom prst="roundRect">
@@ -16324,13 +16324,13 @@
   <p:clrMapOvr>
     <a:masterClrMapping/>
   </p:clrMapOvr>
-  <mc:AlternateContent xmlns:mc="http://schemas.openxmlformats.org/markup-compatibility/2006">
-    <mc:Choice xmlns:p159="http://schemas.microsoft.com/office/powerpoint/2015/09/main" Requires="p159">
+  <mc:AlternateContent xmlns:mc="http://schemas.openxmlformats.org/markup-compatibility/2006" xmlns:p159="http://schemas.microsoft.com/office/powerpoint/2015/09/main">
+    <mc:Choice Requires="p159">
       <p:transition xmlns:p14="http://schemas.microsoft.com/office/powerpoint/2010/main" spd="slow" p14:dur="2000">
         <p159:morph option="byObject"/>
       </p:transition>
     </mc:Choice>
-    <mc:Fallback>
+    <mc:Fallback xmlns="">
       <p:transition spd="slow">
         <p:fade/>
       </p:transition>
@@ -16459,13 +16459,13 @@
   <p:clrMapOvr>
     <a:masterClrMapping/>
   </p:clrMapOvr>
-  <mc:AlternateContent xmlns:mc="http://schemas.openxmlformats.org/markup-compatibility/2006">
-    <mc:Choice xmlns:p159="http://schemas.microsoft.com/office/powerpoint/2015/09/main" Requires="p159">
+  <mc:AlternateContent xmlns:mc="http://schemas.openxmlformats.org/markup-compatibility/2006" xmlns:p159="http://schemas.microsoft.com/office/powerpoint/2015/09/main">
+    <mc:Choice Requires="p159">
       <p:transition xmlns:p14="http://schemas.microsoft.com/office/powerpoint/2010/main" spd="slow" p14:dur="2000">
         <p159:morph option="byObject"/>
       </p:transition>
     </mc:Choice>
-    <mc:Fallback>
+    <mc:Fallback xmlns="">
       <p:transition spd="slow">
         <p:fade/>
       </p:transition>

</xml_diff>